<commit_message>
Mise à jour du fichier PowerPoint ReNew Sénégal
</commit_message>
<xml_diff>
--- a/ReNew_Senegal_Presentation.pptx
+++ b/ReNew_Senegal_Presentation.pptx
@@ -319,7 +319,7 @@
           <a:p>
             <a:fld id="{5BCAD085-E8A6-8845-BD4E-CB4CCA059FC4}" type="datetimeFigureOut">
               <a:rPr lang="en-US" smtClean="0"/>
-              <a:t>6/7/2025</a:t>
+              <a:t>6/22/2025</a:t>
             </a:fld>
             <a:endParaRPr lang="en-US"/>
           </a:p>
@@ -489,7 +489,7 @@
           <a:p>
             <a:fld id="{5BCAD085-E8A6-8845-BD4E-CB4CCA059FC4}" type="datetimeFigureOut">
               <a:rPr lang="en-US" smtClean="0"/>
-              <a:t>6/7/2025</a:t>
+              <a:t>6/22/2025</a:t>
             </a:fld>
             <a:endParaRPr lang="en-US"/>
           </a:p>
@@ -669,7 +669,7 @@
           <a:p>
             <a:fld id="{5BCAD085-E8A6-8845-BD4E-CB4CCA059FC4}" type="datetimeFigureOut">
               <a:rPr lang="en-US" smtClean="0"/>
-              <a:t>6/7/2025</a:t>
+              <a:t>6/22/2025</a:t>
             </a:fld>
             <a:endParaRPr lang="en-US"/>
           </a:p>
@@ -839,7 +839,7 @@
           <a:p>
             <a:fld id="{5BCAD085-E8A6-8845-BD4E-CB4CCA059FC4}" type="datetimeFigureOut">
               <a:rPr lang="en-US" smtClean="0"/>
-              <a:t>6/7/2025</a:t>
+              <a:t>6/22/2025</a:t>
             </a:fld>
             <a:endParaRPr lang="en-US"/>
           </a:p>
@@ -1085,7 +1085,7 @@
           <a:p>
             <a:fld id="{5BCAD085-E8A6-8845-BD4E-CB4CCA059FC4}" type="datetimeFigureOut">
               <a:rPr lang="en-US" smtClean="0"/>
-              <a:t>6/7/2025</a:t>
+              <a:t>6/22/2025</a:t>
             </a:fld>
             <a:endParaRPr lang="en-US"/>
           </a:p>
@@ -1373,7 +1373,7 @@
           <a:p>
             <a:fld id="{5BCAD085-E8A6-8845-BD4E-CB4CCA059FC4}" type="datetimeFigureOut">
               <a:rPr lang="en-US" smtClean="0"/>
-              <a:t>6/7/2025</a:t>
+              <a:t>6/22/2025</a:t>
             </a:fld>
             <a:endParaRPr lang="en-US"/>
           </a:p>
@@ -1795,7 +1795,7 @@
           <a:p>
             <a:fld id="{5BCAD085-E8A6-8845-BD4E-CB4CCA059FC4}" type="datetimeFigureOut">
               <a:rPr lang="en-US" smtClean="0"/>
-              <a:t>6/7/2025</a:t>
+              <a:t>6/22/2025</a:t>
             </a:fld>
             <a:endParaRPr lang="en-US"/>
           </a:p>
@@ -1913,7 +1913,7 @@
           <a:p>
             <a:fld id="{5BCAD085-E8A6-8845-BD4E-CB4CCA059FC4}" type="datetimeFigureOut">
               <a:rPr lang="en-US" smtClean="0"/>
-              <a:t>6/7/2025</a:t>
+              <a:t>6/22/2025</a:t>
             </a:fld>
             <a:endParaRPr lang="en-US"/>
           </a:p>
@@ -2008,7 +2008,7 @@
           <a:p>
             <a:fld id="{5BCAD085-E8A6-8845-BD4E-CB4CCA059FC4}" type="datetimeFigureOut">
               <a:rPr lang="en-US" smtClean="0"/>
-              <a:t>6/7/2025</a:t>
+              <a:t>6/22/2025</a:t>
             </a:fld>
             <a:endParaRPr lang="en-US"/>
           </a:p>
@@ -2285,7 +2285,7 @@
           <a:p>
             <a:fld id="{5BCAD085-E8A6-8845-BD4E-CB4CCA059FC4}" type="datetimeFigureOut">
               <a:rPr lang="en-US" smtClean="0"/>
-              <a:t>6/7/2025</a:t>
+              <a:t>6/22/2025</a:t>
             </a:fld>
             <a:endParaRPr lang="en-US"/>
           </a:p>
@@ -2538,7 +2538,7 @@
           <a:p>
             <a:fld id="{5BCAD085-E8A6-8845-BD4E-CB4CCA059FC4}" type="datetimeFigureOut">
               <a:rPr lang="en-US" smtClean="0"/>
-              <a:t>6/7/2025</a:t>
+              <a:t>6/22/2025</a:t>
             </a:fld>
             <a:endParaRPr lang="en-US"/>
           </a:p>
@@ -2751,7 +2751,7 @@
           <a:p>
             <a:fld id="{5BCAD085-E8A6-8845-BD4E-CB4CCA059FC4}" type="datetimeFigureOut">
               <a:rPr lang="en-US" smtClean="0"/>
-              <a:t>6/7/2025</a:t>
+              <a:t>6/22/2025</a:t>
             </a:fld>
             <a:endParaRPr lang="en-US"/>
           </a:p>
@@ -3362,7 +3362,6 @@
               <a:rPr lang="fr-FR" dirty="0"/>
               <a:t>Page de confirmation de Commande</a:t>
             </a:r>
-            <a:endParaRPr lang="fr-FR" dirty="0"/>
           </a:p>
         </p:txBody>
       </p:sp>
@@ -3532,30 +3531,6 @@
           <a:chExt cx="0" cy="0"/>
         </a:xfrm>
       </p:grpSpPr>
-      <p:pic>
-        <p:nvPicPr>
-          <p:cNvPr id="4" name="Picture 3" descr="Page detail commande.png"/>
-          <p:cNvPicPr>
-            <a:picLocks noChangeAspect="1"/>
-          </p:cNvPicPr>
-          <p:nvPr/>
-        </p:nvPicPr>
-        <p:blipFill>
-          <a:blip r:embed="rId2"/>
-          <a:stretch>
-            <a:fillRect/>
-          </a:stretch>
-        </p:blipFill>
-        <p:spPr>
-          <a:xfrm>
-            <a:off x="1889760" y="1051560"/>
-            <a:ext cx="8945166" cy="4145280"/>
-          </a:xfrm>
-          <a:prstGeom prst="rect">
-            <a:avLst/>
-          </a:prstGeom>
-        </p:spPr>
-      </p:pic>
       <p:sp>
         <p:nvSpPr>
           <p:cNvPr id="5" name="Rectangle 4"/>
@@ -3611,7 +3586,6 @@
               <a:rPr lang="fr-FR" dirty="0"/>
               <a:t> de Commande</a:t>
             </a:r>
-            <a:endParaRPr lang="fr-FR" dirty="0"/>
           </a:p>
         </p:txBody>
       </p:sp>
@@ -3754,6 +3728,36 @@
           </a:p>
         </p:txBody>
       </p:sp>
+      <p:pic>
+        <p:nvPicPr>
+          <p:cNvPr id="2" name="Image 1"/>
+          <p:cNvPicPr>
+            <a:picLocks noChangeAspect="1"/>
+          </p:cNvPicPr>
+          <p:nvPr/>
+        </p:nvPicPr>
+        <p:blipFill>
+          <a:blip r:embed="rId2">
+            <a:extLst>
+              <a:ext uri="{28A0092B-C50C-407E-A947-70E740481C1C}">
+                <a14:useLocalDpi xmlns:a14="http://schemas.microsoft.com/office/drawing/2010/main" val="0"/>
+              </a:ext>
+            </a:extLst>
+          </a:blip>
+          <a:stretch>
+            <a:fillRect/>
+          </a:stretch>
+        </p:blipFill>
+        <p:spPr>
+          <a:xfrm>
+            <a:off x="1157288" y="1004082"/>
+            <a:ext cx="10315575" cy="4192758"/>
+          </a:xfrm>
+          <a:prstGeom prst="rect">
+            <a:avLst/>
+          </a:prstGeom>
+        </p:spPr>
+      </p:pic>
     </p:spTree>
   </p:cSld>
   <p:clrMapOvr>
@@ -3850,7 +3854,6 @@
               <a:rPr lang="fr-FR" dirty="0"/>
               <a:t>Page de l’historique des commandes</a:t>
             </a:r>
-            <a:endParaRPr lang="fr-FR" dirty="0"/>
           </a:p>
         </p:txBody>
       </p:sp>
@@ -4483,30 +4486,6 @@
           <a:chExt cx="0" cy="0"/>
         </a:xfrm>
       </p:grpSpPr>
-      <p:pic>
-        <p:nvPicPr>
-          <p:cNvPr id="4" name="Picture 3" descr="Supportclient contact.png"/>
-          <p:cNvPicPr>
-            <a:picLocks noChangeAspect="1"/>
-          </p:cNvPicPr>
-          <p:nvPr/>
-        </p:nvPicPr>
-        <p:blipFill>
-          <a:blip r:embed="rId2"/>
-          <a:stretch>
-            <a:fillRect/>
-          </a:stretch>
-        </p:blipFill>
-        <p:spPr>
-          <a:xfrm>
-            <a:off x="2011680" y="1084897"/>
-            <a:ext cx="8945166" cy="3984966"/>
-          </a:xfrm>
-          <a:prstGeom prst="rect">
-            <a:avLst/>
-          </a:prstGeom>
-        </p:spPr>
-      </p:pic>
       <p:sp>
         <p:nvSpPr>
           <p:cNvPr id="5" name="Rectangle 4"/>
@@ -4554,7 +4533,6 @@
               <a:rPr lang="fr-FR" dirty="0"/>
               <a:t>Support client / Contact</a:t>
             </a:r>
-            <a:endParaRPr lang="fr-FR" dirty="0"/>
           </a:p>
         </p:txBody>
       </p:sp>
@@ -4705,6 +4683,36 @@
           </a:p>
         </p:txBody>
       </p:sp>
+      <p:pic>
+        <p:nvPicPr>
+          <p:cNvPr id="2" name="Image 1"/>
+          <p:cNvPicPr>
+            <a:picLocks noChangeAspect="1"/>
+          </p:cNvPicPr>
+          <p:nvPr/>
+        </p:nvPicPr>
+        <p:blipFill>
+          <a:blip r:embed="rId2">
+            <a:extLst>
+              <a:ext uri="{28A0092B-C50C-407E-A947-70E740481C1C}">
+                <a14:useLocalDpi xmlns:a14="http://schemas.microsoft.com/office/drawing/2010/main" val="0"/>
+              </a:ext>
+            </a:extLst>
+          </a:blip>
+          <a:stretch>
+            <a:fillRect/>
+          </a:stretch>
+        </p:blipFill>
+        <p:spPr>
+          <a:xfrm>
+            <a:off x="1165224" y="991847"/>
+            <a:ext cx="9858375" cy="4040796"/>
+          </a:xfrm>
+          <a:prstGeom prst="rect">
+            <a:avLst/>
+          </a:prstGeom>
+        </p:spPr>
+      </p:pic>
     </p:spTree>
   </p:cSld>
   <p:clrMapOvr>
@@ -4809,7 +4817,6 @@
               <a:rPr lang="fr-FR" dirty="0"/>
               <a:t> Sénégal</a:t>
             </a:r>
-            <a:endParaRPr lang="fr-FR" dirty="0"/>
           </a:p>
         </p:txBody>
       </p:sp>
@@ -5395,7 +5402,7 @@
             </a:pPr>
             <a:r>
               <a:rPr lang="fr-FR" sz="2000" dirty="0" smtClean="0"/>
-              <a:t>Permet </a:t>
+              <a:t>Cette page Permet </a:t>
             </a:r>
             <a:r>
               <a:rPr lang="fr-FR" sz="2000" dirty="0"/>
@@ -6112,7 +6119,6 @@
               <a:rPr lang="fr-FR" dirty="0"/>
               <a:t>Catalogue des produits</a:t>
             </a:r>
-            <a:endParaRPr lang="fr-FR" dirty="0"/>
           </a:p>
         </p:txBody>
       </p:sp>
@@ -6393,7 +6399,6 @@
               <a:rPr lang="fr-FR" dirty="0"/>
               <a:t>Fiche produit détaillée</a:t>
             </a:r>
-            <a:endParaRPr lang="fr-FR" dirty="0"/>
           </a:p>
         </p:txBody>
       </p:sp>
@@ -6682,7 +6687,6 @@
               <a:rPr lang="fr-FR" dirty="0"/>
               <a:t>Panier d'achat</a:t>
             </a:r>
-            <a:endParaRPr lang="fr-FR" dirty="0"/>
           </a:p>
         </p:txBody>
       </p:sp>

</xml_diff>